<commit_message>
Add next steps to presentation
</commit_message>
<xml_diff>
--- a/03-status-report/fehle_halbhuber_sasse_being_as_fast.pptx
+++ b/03-status-report/fehle_halbhuber_sasse_being_as_fast.pptx
@@ -5,17 +5,18 @@
     <p:sldMasterId id="2147483648" r:id="rId1"/>
   </p:sldMasterIdLst>
   <p:notesMasterIdLst>
-    <p:notesMasterId r:id="rId7"/>
+    <p:notesMasterId r:id="rId8"/>
   </p:notesMasterIdLst>
   <p:handoutMasterIdLst>
-    <p:handoutMasterId r:id="rId8"/>
+    <p:handoutMasterId r:id="rId9"/>
   </p:handoutMasterIdLst>
   <p:sldIdLst>
     <p:sldId id="258" r:id="rId2"/>
     <p:sldId id="276" r:id="rId3"/>
     <p:sldId id="259" r:id="rId4"/>
     <p:sldId id="275" r:id="rId5"/>
-    <p:sldId id="273" r:id="rId6"/>
+    <p:sldId id="277" r:id="rId6"/>
+    <p:sldId id="273" r:id="rId7"/>
   </p:sldIdLst>
   <p:sldSz cx="9144000" cy="6858000" type="screen4x3"/>
   <p:notesSz cx="6858000" cy="9144000"/>
@@ -123,6 +124,7 @@
             <p14:sldId id="276"/>
             <p14:sldId id="259"/>
             <p14:sldId id="275"/>
+            <p14:sldId id="277"/>
           </p14:sldIdLst>
         </p14:section>
         <p14:section name="Standardabschnitt" id="{792A8748-0787-4485-96F9-953F837C116F}">
@@ -5922,6 +5924,160 @@
       </p:grpSpPr>
       <p:sp>
         <p:nvSpPr>
+          <p:cNvPr id="2" name="Titel 1">
+            <a:extLst>
+              <a:ext uri="{FF2B5EF4-FFF2-40B4-BE49-F238E27FC236}">
+                <a16:creationId xmlns:a16="http://schemas.microsoft.com/office/drawing/2014/main" id="{2A42FEB0-5048-4439-BF38-0C19C3532315}"/>
+              </a:ext>
+            </a:extLst>
+          </p:cNvPr>
+          <p:cNvSpPr>
+            <a:spLocks noGrp="1"/>
+          </p:cNvSpPr>
+          <p:nvPr>
+            <p:ph type="title"/>
+          </p:nvPr>
+        </p:nvSpPr>
+        <p:spPr/>
+        <p:txBody>
+          <a:bodyPr/>
+          <a:lstStyle/>
+          <a:p>
+            <a:r>
+              <a:rPr lang="de-DE"/>
+              <a:t>Next Steps</a:t>
+            </a:r>
+            <a:endParaRPr lang="de-DE" dirty="0"/>
+          </a:p>
+        </p:txBody>
+      </p:sp>
+      <p:sp>
+        <p:nvSpPr>
+          <p:cNvPr id="4" name="Foliennummernplatzhalter 3">
+            <a:extLst>
+              <a:ext uri="{FF2B5EF4-FFF2-40B4-BE49-F238E27FC236}">
+                <a16:creationId xmlns:a16="http://schemas.microsoft.com/office/drawing/2014/main" id="{4FCFF55B-CB17-417D-97C3-58B0E9907247}"/>
+              </a:ext>
+            </a:extLst>
+          </p:cNvPr>
+          <p:cNvSpPr>
+            <a:spLocks noGrp="1"/>
+          </p:cNvSpPr>
+          <p:nvPr>
+            <p:ph type="sldNum" sz="quarter" idx="10"/>
+          </p:nvPr>
+        </p:nvSpPr>
+        <p:spPr/>
+        <p:txBody>
+          <a:bodyPr/>
+          <a:lstStyle/>
+          <a:p>
+            <a:fld id="{9BBAE405-9238-4745-AB75-58013C9D9462}" type="slidenum">
+              <a:rPr lang="de-DE" smtClean="0"/>
+              <a:t>5</a:t>
+            </a:fld>
+            <a:endParaRPr lang="de-DE" dirty="0"/>
+          </a:p>
+        </p:txBody>
+      </p:sp>
+      <p:sp>
+        <p:nvSpPr>
+          <p:cNvPr id="3" name="Inhaltsplatzhalter 2">
+            <a:extLst>
+              <a:ext uri="{FF2B5EF4-FFF2-40B4-BE49-F238E27FC236}">
+                <a16:creationId xmlns:a16="http://schemas.microsoft.com/office/drawing/2014/main" id="{7181ACB9-754C-4256-8915-87AB78FCEF1F}"/>
+              </a:ext>
+            </a:extLst>
+          </p:cNvPr>
+          <p:cNvSpPr>
+            <a:spLocks noGrp="1"/>
+          </p:cNvSpPr>
+          <p:nvPr>
+            <p:ph sz="half" idx="1"/>
+          </p:nvPr>
+        </p:nvSpPr>
+        <p:spPr/>
+        <p:txBody>
+          <a:bodyPr/>
+          <a:lstStyle/>
+          <a:p>
+            <a:pPr>
+              <a:buFont typeface="Arial" panose="020B0604020202020204" pitchFamily="34" charset="0"/>
+              <a:buChar char="•"/>
+            </a:pPr>
+            <a:r>
+              <a:rPr lang="de-DE"/>
+              <a:t>Building and testing latency test framework</a:t>
+            </a:r>
+          </a:p>
+          <a:p>
+            <a:pPr>
+              <a:buFont typeface="Arial" panose="020B0604020202020204" pitchFamily="34" charset="0"/>
+              <a:buChar char="•"/>
+            </a:pPr>
+            <a:endParaRPr lang="de-DE"/>
+          </a:p>
+          <a:p>
+            <a:pPr>
+              <a:buFont typeface="Arial" panose="020B0604020202020204" pitchFamily="34" charset="0"/>
+              <a:buChar char="•"/>
+            </a:pPr>
+            <a:r>
+              <a:rPr lang="de-DE"/>
+              <a:t>Motion data acquisition framework</a:t>
+            </a:r>
+          </a:p>
+          <a:p>
+            <a:pPr>
+              <a:buFont typeface="Arial" panose="020B0604020202020204" pitchFamily="34" charset="0"/>
+              <a:buChar char="•"/>
+            </a:pPr>
+            <a:endParaRPr lang="de-DE"/>
+          </a:p>
+          <a:p>
+            <a:pPr>
+              <a:buFont typeface="Arial" panose="020B0604020202020204" pitchFamily="34" charset="0"/>
+              <a:buChar char="•"/>
+            </a:pPr>
+            <a:r>
+              <a:rPr lang="en-US"/>
+              <a:t>Testing data acquisition</a:t>
+            </a:r>
+          </a:p>
+        </p:txBody>
+      </p:sp>
+    </p:spTree>
+    <p:extLst>
+      <p:ext uri="{BB962C8B-B14F-4D97-AF65-F5344CB8AC3E}">
+        <p14:creationId xmlns:p14="http://schemas.microsoft.com/office/powerpoint/2010/main" val="3341079957"/>
+      </p:ext>
+    </p:extLst>
+  </p:cSld>
+  <p:clrMapOvr>
+    <a:masterClrMapping/>
+  </p:clrMapOvr>
+</p:sld>
+</file>
+
+<file path=ppt/slides/slide6.xml><?xml version="1.0" encoding="utf-8"?>
+<p:sld xmlns:a="http://schemas.openxmlformats.org/drawingml/2006/main" xmlns:r="http://schemas.openxmlformats.org/officeDocument/2006/relationships" xmlns:p="http://schemas.openxmlformats.org/presentationml/2006/main">
+  <p:cSld>
+    <p:spTree>
+      <p:nvGrpSpPr>
+        <p:cNvPr id="1" name=""/>
+        <p:cNvGrpSpPr/>
+        <p:nvPr/>
+      </p:nvGrpSpPr>
+      <p:grpSpPr>
+        <a:xfrm>
+          <a:off x="0" y="0"/>
+          <a:ext cx="0" cy="0"/>
+          <a:chOff x="0" y="0"/>
+          <a:chExt cx="0" cy="0"/>
+        </a:xfrm>
+      </p:grpSpPr>
+      <p:sp>
+        <p:nvSpPr>
           <p:cNvPr id="5" name="Titel 4">
             <a:extLst>
               <a:ext uri="{FF2B5EF4-FFF2-40B4-BE49-F238E27FC236}">
@@ -5990,7 +6146,7 @@
           <a:p>
             <a:fld id="{9BBAE405-9238-4745-AB75-58013C9D9462}" type="slidenum">
               <a:rPr lang="de-DE" smtClean="0"/>
-              <a:t>5</a:t>
+              <a:t>6</a:t>
             </a:fld>
             <a:endParaRPr lang="de-DE" dirty="0"/>
           </a:p>

</xml_diff>